<commit_message>
edit app.component.html and docs
</commit_message>
<xml_diff>
--- a/docs/Angular-Part-1.pptx
+++ b/docs/Angular-Part-1.pptx
@@ -212,7 +212,7 @@
           <a:p>
             <a:fld id="{CE406B13-DEAF-4B07-AF2F-A1A5A92A4FB2}" type="datetimeFigureOut">
               <a:rPr lang="fr-FR" smtClean="0"/>
-              <a:t>13/04/2020</a:t>
+              <a:t>15/04/2020</a:t>
             </a:fld>
             <a:endParaRPr lang="fr-FR"/>
           </a:p>
@@ -371,7 +371,7 @@
           <a:p>
             <a:fld id="{27E3F270-17A1-4D56-92F6-C91C9C0EC90A}" type="slidenum">
               <a:rPr lang="fr-FR" smtClean="0"/>
-              <a:t>‹N°›</a:t>
+              <a:t>‹#›</a:t>
             </a:fld>
             <a:endParaRPr lang="fr-FR"/>
           </a:p>
@@ -611,7 +611,7 @@
           <a:p>
             <a:fld id="{84B45E61-795A-4F30-90D8-45CF12E90720}" type="datetime1">
               <a:rPr lang="fr-FR" smtClean="0"/>
-              <a:t>13/04/2020</a:t>
+              <a:t>15/04/2020</a:t>
             </a:fld>
             <a:endParaRPr lang="fr-FR"/>
           </a:p>
@@ -653,7 +653,7 @@
           <a:p>
             <a:fld id="{6C324918-07FE-4FF6-AAFE-04A2D9F88AFF}" type="slidenum">
               <a:rPr lang="fr-FR" smtClean="0"/>
-              <a:t>‹N°›</a:t>
+              <a:t>‹#›</a:t>
             </a:fld>
             <a:endParaRPr lang="fr-FR"/>
           </a:p>
@@ -781,7 +781,7 @@
           <a:p>
             <a:fld id="{6068942B-12BC-4A76-B029-E86C288033B6}" type="datetime1">
               <a:rPr lang="fr-FR" smtClean="0"/>
-              <a:t>13/04/2020</a:t>
+              <a:t>15/04/2020</a:t>
             </a:fld>
             <a:endParaRPr lang="fr-FR"/>
           </a:p>
@@ -823,7 +823,7 @@
           <a:p>
             <a:fld id="{6C324918-07FE-4FF6-AAFE-04A2D9F88AFF}" type="slidenum">
               <a:rPr lang="fr-FR" smtClean="0"/>
-              <a:t>‹N°›</a:t>
+              <a:t>‹#›</a:t>
             </a:fld>
             <a:endParaRPr lang="fr-FR"/>
           </a:p>
@@ -961,7 +961,7 @@
           <a:p>
             <a:fld id="{27021572-C5FE-4F6C-AFDE-E77E36B29DAE}" type="datetime1">
               <a:rPr lang="fr-FR" smtClean="0"/>
-              <a:t>13/04/2020</a:t>
+              <a:t>15/04/2020</a:t>
             </a:fld>
             <a:endParaRPr lang="fr-FR"/>
           </a:p>
@@ -1003,7 +1003,7 @@
           <a:p>
             <a:fld id="{6C324918-07FE-4FF6-AAFE-04A2D9F88AFF}" type="slidenum">
               <a:rPr lang="fr-FR" smtClean="0"/>
-              <a:t>‹N°›</a:t>
+              <a:t>‹#›</a:t>
             </a:fld>
             <a:endParaRPr lang="fr-FR"/>
           </a:p>
@@ -1131,7 +1131,7 @@
           <a:p>
             <a:fld id="{40BD3B14-5B65-4026-9DF2-72252127E562}" type="datetime1">
               <a:rPr lang="fr-FR" smtClean="0"/>
-              <a:t>13/04/2020</a:t>
+              <a:t>15/04/2020</a:t>
             </a:fld>
             <a:endParaRPr lang="fr-FR"/>
           </a:p>
@@ -1173,7 +1173,7 @@
           <a:p>
             <a:fld id="{6C324918-07FE-4FF6-AAFE-04A2D9F88AFF}" type="slidenum">
               <a:rPr lang="fr-FR" smtClean="0"/>
-              <a:t>‹N°›</a:t>
+              <a:t>‹#›</a:t>
             </a:fld>
             <a:endParaRPr lang="fr-FR"/>
           </a:p>
@@ -1377,7 +1377,7 @@
           <a:p>
             <a:fld id="{76EE2787-FB7C-4476-A33D-F479AC5F320C}" type="datetime1">
               <a:rPr lang="fr-FR" smtClean="0"/>
-              <a:t>13/04/2020</a:t>
+              <a:t>15/04/2020</a:t>
             </a:fld>
             <a:endParaRPr lang="fr-FR"/>
           </a:p>
@@ -1419,7 +1419,7 @@
           <a:p>
             <a:fld id="{6C324918-07FE-4FF6-AAFE-04A2D9F88AFF}" type="slidenum">
               <a:rPr lang="fr-FR" smtClean="0"/>
-              <a:t>‹N°›</a:t>
+              <a:t>‹#›</a:t>
             </a:fld>
             <a:endParaRPr lang="fr-FR"/>
           </a:p>
@@ -1609,7 +1609,7 @@
           <a:p>
             <a:fld id="{7BFDD3AB-111E-4D42-A976-78536E7F46BC}" type="datetime1">
               <a:rPr lang="fr-FR" smtClean="0"/>
-              <a:t>13/04/2020</a:t>
+              <a:t>15/04/2020</a:t>
             </a:fld>
             <a:endParaRPr lang="fr-FR"/>
           </a:p>
@@ -1651,7 +1651,7 @@
           <a:p>
             <a:fld id="{6C324918-07FE-4FF6-AAFE-04A2D9F88AFF}" type="slidenum">
               <a:rPr lang="fr-FR" smtClean="0"/>
-              <a:t>‹N°›</a:t>
+              <a:t>‹#›</a:t>
             </a:fld>
             <a:endParaRPr lang="fr-FR"/>
           </a:p>
@@ -1976,7 +1976,7 @@
           <a:p>
             <a:fld id="{74FE3D8E-8087-45F5-A2F9-53C3FF823342}" type="datetime1">
               <a:rPr lang="fr-FR" smtClean="0"/>
-              <a:t>13/04/2020</a:t>
+              <a:t>15/04/2020</a:t>
             </a:fld>
             <a:endParaRPr lang="fr-FR"/>
           </a:p>
@@ -2018,7 +2018,7 @@
           <a:p>
             <a:fld id="{6C324918-07FE-4FF6-AAFE-04A2D9F88AFF}" type="slidenum">
               <a:rPr lang="fr-FR" smtClean="0"/>
-              <a:t>‹N°›</a:t>
+              <a:t>‹#›</a:t>
             </a:fld>
             <a:endParaRPr lang="fr-FR"/>
           </a:p>
@@ -2094,7 +2094,7 @@
           <a:p>
             <a:fld id="{C4A586C7-84EF-4114-81DA-E59E1C820B1A}" type="datetime1">
               <a:rPr lang="fr-FR" smtClean="0"/>
-              <a:t>13/04/2020</a:t>
+              <a:t>15/04/2020</a:t>
             </a:fld>
             <a:endParaRPr lang="fr-FR"/>
           </a:p>
@@ -2136,7 +2136,7 @@
           <a:p>
             <a:fld id="{6C324918-07FE-4FF6-AAFE-04A2D9F88AFF}" type="slidenum">
               <a:rPr lang="fr-FR" smtClean="0"/>
-              <a:t>‹N°›</a:t>
+              <a:t>‹#›</a:t>
             </a:fld>
             <a:endParaRPr lang="fr-FR"/>
           </a:p>
@@ -2189,7 +2189,7 @@
           <a:p>
             <a:fld id="{D8F1756C-7996-47D6-9E4C-ABCC1295DF2C}" type="datetime1">
               <a:rPr lang="fr-FR" smtClean="0"/>
-              <a:t>13/04/2020</a:t>
+              <a:t>15/04/2020</a:t>
             </a:fld>
             <a:endParaRPr lang="fr-FR"/>
           </a:p>
@@ -2231,7 +2231,7 @@
           <a:p>
             <a:fld id="{6C324918-07FE-4FF6-AAFE-04A2D9F88AFF}" type="slidenum">
               <a:rPr lang="fr-FR" smtClean="0"/>
-              <a:t>‹N°›</a:t>
+              <a:t>‹#›</a:t>
             </a:fld>
             <a:endParaRPr lang="fr-FR"/>
           </a:p>
@@ -2466,7 +2466,7 @@
           <a:p>
             <a:fld id="{5A2FCC70-6DC4-448D-9BB1-336038987510}" type="datetime1">
               <a:rPr lang="fr-FR" smtClean="0"/>
-              <a:t>13/04/2020</a:t>
+              <a:t>15/04/2020</a:t>
             </a:fld>
             <a:endParaRPr lang="fr-FR"/>
           </a:p>
@@ -2508,7 +2508,7 @@
           <a:p>
             <a:fld id="{6C324918-07FE-4FF6-AAFE-04A2D9F88AFF}" type="slidenum">
               <a:rPr lang="fr-FR" smtClean="0"/>
-              <a:t>‹N°›</a:t>
+              <a:t>‹#›</a:t>
             </a:fld>
             <a:endParaRPr lang="fr-FR"/>
           </a:p>
@@ -2719,7 +2719,7 @@
           <a:p>
             <a:fld id="{E90AA5AA-10FB-40B2-8514-0F09D5DD3657}" type="datetime1">
               <a:rPr lang="fr-FR" smtClean="0"/>
-              <a:t>13/04/2020</a:t>
+              <a:t>15/04/2020</a:t>
             </a:fld>
             <a:endParaRPr lang="fr-FR"/>
           </a:p>
@@ -2761,7 +2761,7 @@
           <a:p>
             <a:fld id="{6C324918-07FE-4FF6-AAFE-04A2D9F88AFF}" type="slidenum">
               <a:rPr lang="fr-FR" smtClean="0"/>
-              <a:t>‹N°›</a:t>
+              <a:t>‹#›</a:t>
             </a:fld>
             <a:endParaRPr lang="fr-FR"/>
           </a:p>
@@ -2932,7 +2932,7 @@
           <a:p>
             <a:fld id="{34AFBF36-051D-4800-8844-F474A60F4D65}" type="datetime1">
               <a:rPr lang="fr-FR" smtClean="0"/>
-              <a:t>13/04/2020</a:t>
+              <a:t>15/04/2020</a:t>
             </a:fld>
             <a:endParaRPr lang="fr-FR"/>
           </a:p>
@@ -3010,7 +3010,7 @@
           <a:p>
             <a:fld id="{6C324918-07FE-4FF6-AAFE-04A2D9F88AFF}" type="slidenum">
               <a:rPr lang="fr-FR" smtClean="0"/>
-              <a:t>‹N°›</a:t>
+              <a:t>‹#›</a:t>
             </a:fld>
             <a:endParaRPr lang="fr-FR"/>
           </a:p>
@@ -4316,19 +4316,11 @@
             </a:pPr>
             <a:r>
               <a:rPr lang="en-US" dirty="0" smtClean="0"/>
-              <a:t>Create a branch to do a </a:t>
-            </a:r>
-            <a:r>
-              <a:rPr lang="en-US" dirty="0" smtClean="0"/>
-              <a:t>task </a:t>
+              <a:t>Create a branch to do a task </a:t>
             </a:r>
             <a:r>
               <a:rPr lang="fr-FR" dirty="0" smtClean="0"/>
-              <a:t>: </a:t>
-            </a:r>
-            <a:r>
-              <a:rPr lang="fr-FR" dirty="0" smtClean="0"/>
-              <a:t>‘’</a:t>
+              <a:t>: ‘’</a:t>
             </a:r>
             <a:r>
               <a:rPr lang="fr-FR" dirty="0" err="1" smtClean="0"/>
@@ -4364,15 +4356,7 @@
             </a:pPr>
             <a:r>
               <a:rPr lang="en-US" sz="2400" dirty="0" smtClean="0"/>
-              <a:t>Add material icon in your </a:t>
-            </a:r>
-            <a:r>
-              <a:rPr lang="en-US" sz="2400" dirty="0" smtClean="0"/>
-              <a:t>project :  </a:t>
-            </a:r>
-            <a:r>
-              <a:rPr lang="en-US" sz="2400" dirty="0" smtClean="0"/>
-              <a:t>&gt;</a:t>
+              <a:t>Add material icon in your project :  &gt;</a:t>
             </a:r>
             <a:r>
               <a:rPr lang="en-US" sz="2400" dirty="0" err="1" smtClean="0"/>
@@ -7191,7 +7175,7 @@
         </p:spPr>
         <p:txBody>
           <a:bodyPr vert="horz" lIns="91440" tIns="45720" rIns="91440" bIns="45720" rtlCol="0">
-            <a:normAutofit/>
+            <a:normAutofit lnSpcReduction="10000"/>
           </a:bodyPr>
           <a:lstStyle>
             <a:lvl1pPr marL="228600" indent="-228600" algn="l" defTabSz="914400" rtl="0" eaLnBrk="1" latinLnBrk="0" hangingPunct="1">
@@ -7419,7 +7403,47 @@
               <a:rPr lang="en-US" dirty="0">
                 <a:hlinkClick r:id="rId8"/>
               </a:rPr>
-              <a:t>https://angular.io/docs</a:t>
+              <a:t>https://</a:t>
+            </a:r>
+            <a:r>
+              <a:rPr lang="en-US" dirty="0" smtClean="0">
+                <a:hlinkClick r:id="rId8"/>
+              </a:rPr>
+              <a:t>angular.io/docs</a:t>
+            </a:r>
+            <a:endParaRPr lang="en-US" dirty="0" smtClean="0"/>
+          </a:p>
+          <a:p>
+            <a:pPr marL="0" indent="0">
+              <a:buNone/>
+            </a:pPr>
+            <a:endParaRPr lang="en-US" dirty="0"/>
+          </a:p>
+          <a:p>
+            <a:r>
+              <a:rPr lang="en-US" dirty="0" smtClean="0"/>
+              <a:t>GitHub project repository</a:t>
+            </a:r>
+          </a:p>
+          <a:p>
+            <a:pPr marL="0" indent="0">
+              <a:buNone/>
+            </a:pPr>
+            <a:r>
+              <a:rPr lang="en-US" dirty="0">
+                <a:hlinkClick r:id="rId9"/>
+              </a:rPr>
+              <a:t>https://</a:t>
+            </a:r>
+            <a:r>
+              <a:rPr lang="en-US" dirty="0" smtClean="0">
+                <a:hlinkClick r:id="rId9"/>
+              </a:rPr>
+              <a:t>github.com/JessicaTsopgni/biblioIUC.git</a:t>
+            </a:r>
+            <a:r>
+              <a:rPr lang="en-US" dirty="0" smtClean="0"/>
+              <a:t> </a:t>
             </a:r>
             <a:endParaRPr lang="en-US" dirty="0" smtClean="0"/>
           </a:p>
@@ -9129,15 +9153,7 @@
             </a:pPr>
             <a:r>
               <a:rPr lang="en-US" dirty="0" smtClean="0"/>
-              <a:t>Install Angular </a:t>
-            </a:r>
-            <a:r>
-              <a:rPr lang="en-US" dirty="0" smtClean="0"/>
-              <a:t>in command line : </a:t>
-            </a:r>
-            <a:r>
-              <a:rPr lang="en-US" dirty="0" smtClean="0"/>
-              <a:t>&gt;</a:t>
+              <a:t>Install Angular in command line : &gt;</a:t>
             </a:r>
             <a:r>
               <a:rPr lang="en-US" dirty="0" err="1" smtClean="0"/>
@@ -11164,15 +11180,7 @@
             </a:r>
             <a:r>
               <a:rPr lang="en-US" dirty="0" smtClean="0"/>
-              <a:t>” : </a:t>
-            </a:r>
-            <a:r>
-              <a:rPr lang="en-US" dirty="0" smtClean="0"/>
-              <a:t>&gt;ng </a:t>
-            </a:r>
-            <a:r>
-              <a:rPr lang="en-US" dirty="0" smtClean="0"/>
-              <a:t>new </a:t>
+              <a:t>” : &gt;ng new </a:t>
             </a:r>
             <a:r>
               <a:rPr lang="en-US" dirty="0" err="1" smtClean="0"/>
@@ -11188,11 +11196,7 @@
             </a:pPr>
             <a:r>
               <a:rPr lang="en-US" dirty="0" smtClean="0"/>
-              <a:t>Add project folder </a:t>
-            </a:r>
-            <a:r>
-              <a:rPr lang="en-US" dirty="0" smtClean="0"/>
-              <a:t>on </a:t>
+              <a:t>Add project folder on </a:t>
             </a:r>
             <a:r>
               <a:rPr lang="en-US" dirty="0" err="1" smtClean="0"/>
@@ -11230,15 +11234,7 @@
             </a:pPr>
             <a:r>
               <a:rPr lang="en-US" dirty="0" smtClean="0"/>
-              <a:t>Execute project : </a:t>
-            </a:r>
-            <a:r>
-              <a:rPr lang="en-US" dirty="0" smtClean="0"/>
-              <a:t>&gt;ng </a:t>
-            </a:r>
-            <a:r>
-              <a:rPr lang="en-US" dirty="0" smtClean="0"/>
-              <a:t>serve</a:t>
+              <a:t>Execute project : &gt;ng serve</a:t>
             </a:r>
           </a:p>
           <a:p>
@@ -11296,15 +11292,15 @@
             </a:r>
             <a:r>
               <a:rPr lang="en-US" dirty="0"/>
-              <a:t>: &gt;ng new </a:t>
-            </a:r>
-            <a:r>
-              <a:rPr lang="en-US" dirty="0" err="1" smtClean="0"/>
-              <a:t>biblio</a:t>
-            </a:r>
-            <a:r>
-              <a:rPr lang="en-US" dirty="0" smtClean="0"/>
-              <a:t> </a:t>
+              <a:t>: &gt;</a:t>
+            </a:r>
+            <a:r>
+              <a:rPr lang="en-US"/>
+              <a:t>ng </a:t>
+            </a:r>
+            <a:r>
+              <a:rPr lang="en-US" smtClean="0"/>
+              <a:t>serve</a:t>
             </a:r>
             <a:endParaRPr lang="en-US" dirty="0" smtClean="0"/>
           </a:p>

</xml_diff>